<commit_message>
powerpoint template: change title
</commit_message>
<xml_diff>
--- a/powerpoint-template/HNI_SCT_Template_low_resolution.pptx
+++ b/powerpoint-template/HNI_SCT_Template_low_resolution.pptx
@@ -283,7 +283,7 @@
           <a:p>
             <a:fld id="{A1B87758-AD31-4194-90BB-989A2A82B1D1}" type="datetimeFigureOut">
               <a:rPr lang="de-DE" smtClean="0"/>
-              <a:t>26.05.2025</a:t>
+              <a:t>19.08.2025</a:t>
             </a:fld>
             <a:endParaRPr lang="de-DE"/>
           </a:p>
@@ -448,7 +448,7 @@
           <a:p>
             <a:fld id="{C8930F80-4E1A-4DB0-9712-170FF40CA8AD}" type="datetimeFigureOut">
               <a:rPr lang="de-DE" smtClean="0"/>
-              <a:t>26.05.2025</a:t>
+              <a:t>19.08.2025</a:t>
             </a:fld>
             <a:endParaRPr lang="de-DE"/>
           </a:p>

</xml_diff>